<commit_message>
rename help file name
</commit_message>
<xml_diff>
--- a/doc/2021-12_TriXX_IT-Tage.pptx
+++ b/doc/2021-12_TriXX_IT-Tage.pptx
@@ -398,7 +398,7 @@
           <a:p>
             <a:fld id="{65198459-C4F2-C045-9966-EFD31D2DED12}" type="datetime1">
               <a:rPr lang="de-DE" smtClean="0"/>
-              <a:t>28.11.21</a:t>
+              <a:t>02.12.21</a:t>
             </a:fld>
             <a:endParaRPr lang="de-DE"/>
           </a:p>
@@ -564,7 +564,7 @@
           <a:p>
             <a:fld id="{DFE97338-3F22-2E45-8586-98FF6A44F26F}" type="datetime1">
               <a:rPr lang="de-DE" smtClean="0"/>
-              <a:t>28.11.21</a:t>
+              <a:t>02.12.21</a:t>
             </a:fld>
             <a:endParaRPr lang="de-DE"/>
           </a:p>
@@ -6262,7 +6262,7 @@
           </a:prstGeom>
           <a:extLst>
             <a:ext uri="{C572A759-6A51-4108-AA02-DFA0A04FC94B}">
-              <ma14:wrappingTextBoxFlag xmlns="" xmlns:ma14="http://schemas.microsoft.com/office/mac/drawingml/2011/main" val="1"/>
+              <ma14:wrappingTextBoxFlag xmlns:ma14="http://schemas.microsoft.com/office/mac/drawingml/2011/main" xmlns="" val="1"/>
             </a:ext>
           </a:extLst>
         </p:spPr>
@@ -10565,8 +10565,8 @@
         </p:nvSpPr>
         <p:spPr>
           <a:xfrm>
-            <a:off x="544452" y="2540927"/>
-            <a:ext cx="5395485" cy="1016076"/>
+            <a:off x="398979" y="2212712"/>
+            <a:ext cx="5395485" cy="1121654"/>
           </a:xfrm>
           <a:prstGeom prst="rect">
             <a:avLst/>
@@ -10576,7 +10576,7 @@
           </a:ln>
           <a:extLst>
             <a:ext uri="{C572A759-6A51-4108-AA02-DFA0A04FC94B}">
-              <ma14:wrappingTextBoxFlag xmlns="" xmlns:ma14="http://schemas.microsoft.com/office/mac/drawingml/2011/main" val="1"/>
+              <ma14:wrappingTextBoxFlag xmlns:ma14="http://schemas.microsoft.com/office/mac/drawingml/2011/main" xmlns="" val="1"/>
             </a:ext>
           </a:extLst>
         </p:spPr>
@@ -10869,7 +10869,32 @@
                 <a:cs typeface="Arial"/>
                 <a:sym typeface="Arial"/>
               </a:rPr>
-              <a:t>TriXX</a:t>
+              <a:t>MOVEX </a:t>
+            </a:r>
+          </a:p>
+          <a:p>
+            <a:pPr algn="l" defTabSz="227978" hangingPunct="1">
+              <a:defRPr sz="8800">
+                <a:solidFill>
+                  <a:srgbClr val="FFFFFF"/>
+                </a:solidFill>
+                <a:latin typeface="Arial"/>
+                <a:ea typeface="Arial"/>
+                <a:cs typeface="Arial"/>
+                <a:sym typeface="Arial"/>
+              </a:defRPr>
+            </a:pPr>
+            <a:r>
+              <a:rPr lang="de-DE" sz="3600" dirty="0">
+                <a:solidFill>
+                  <a:schemeClr val="bg1"/>
+                </a:solidFill>
+                <a:latin typeface="Arial"/>
+                <a:ea typeface="Arial"/>
+                <a:cs typeface="Arial"/>
+                <a:sym typeface="Arial"/>
+              </a:rPr>
+              <a:t>Change Data Capture</a:t>
             </a:r>
           </a:p>
         </p:txBody>
@@ -10888,7 +10913,7 @@
         </p:nvSpPr>
         <p:spPr>
           <a:xfrm>
-            <a:off x="544452" y="2359988"/>
+            <a:off x="471715" y="1718368"/>
             <a:ext cx="1491995" cy="361878"/>
           </a:xfrm>
           <a:prstGeom prst="rect">
@@ -10899,7 +10924,7 @@
           </a:ln>
           <a:extLst>
             <a:ext uri="{C572A759-6A51-4108-AA02-DFA0A04FC94B}">
-              <ma14:wrappingTextBoxFlag xmlns:ma14="http://schemas.microsoft.com/office/mac/drawingml/2011/main" xmlns="" val="1"/>
+              <ma14:wrappingTextBoxFlag xmlns="" xmlns:ma14="http://schemas.microsoft.com/office/mac/drawingml/2011/main" val="1"/>
             </a:ext>
           </a:extLst>
         </p:spPr>
@@ -10952,7 +10977,7 @@
         </p:nvSpPr>
         <p:spPr>
           <a:xfrm>
-            <a:off x="544452" y="3787146"/>
+            <a:off x="471715" y="3798614"/>
             <a:ext cx="4515921" cy="977431"/>
           </a:xfrm>
           <a:prstGeom prst="rect">
@@ -10963,7 +10988,7 @@
           </a:ln>
           <a:extLst>
             <a:ext uri="{C572A759-6A51-4108-AA02-DFA0A04FC94B}">
-              <ma14:wrappingTextBoxFlag xmlns:ma14="http://schemas.microsoft.com/office/mac/drawingml/2011/main" xmlns="" val="1"/>
+              <ma14:wrappingTextBoxFlag xmlns="" xmlns:ma14="http://schemas.microsoft.com/office/mac/drawingml/2011/main" val="1"/>
             </a:ext>
           </a:extLst>
         </p:spPr>
@@ -11366,7 +11391,7 @@
                 <a:ea typeface="Calibri" charset="0"/>
                 <a:cs typeface="Calibri" charset="0"/>
               </a:rPr>
-              <a:t>Eigenes Schema kapselt alle TriXX-relevanten Objekte in DB</a:t>
+              <a:t>Eigenes Schema kapselt alle relevanten DB-Objekte der Applikation </a:t>
             </a:r>
           </a:p>
         </p:txBody>
@@ -12077,7 +12102,7 @@
                 <a:ea typeface="Calibri" charset="0"/>
                 <a:cs typeface="Calibri" charset="0"/>
               </a:rPr>
-              <a:t>Über JSON-Import Generierung der TriXX-Konfiguration aus externen Quellen möglich, z.B. Konfiguration aus RCS</a:t>
+              <a:t>Über JSON-Import Generierung der Konfiguration aus externen Quellen möglich, z.B. Konfiguration aus RCS</a:t>
             </a:r>
           </a:p>
         </p:txBody>
@@ -13229,7 +13254,7 @@
                 <a:ea typeface="Calibri" charset="0"/>
                 <a:cs typeface="Calibri" charset="0"/>
               </a:rPr>
-              <a:t>TriXX wurde modular und DB-unabhängig entwickelt auf Basis von Ruby on </a:t>
+              <a:t>MOVEX Change Data Capture wurde DB-unabhängig entwickelt auf der Basis von Ruby on </a:t>
             </a:r>
             <a:r>
               <a:rPr lang="de-DE" dirty="0" err="1">
@@ -19571,7 +19596,7 @@
               <a:rPr lang="de-DE" dirty="0">
                 <a:latin typeface="+mn-lt"/>
               </a:rPr>
-              <a:t>TriXX unterstützt Keys: Kein Key, Primary Key der Quell-Tabelle fester Wert oder Transaction-ID</a:t>
+              <a:t>Unterstützte Keys: Kein Key, Primary Key der Quell-Tabelle fester Wert oder Transaction-ID</a:t>
             </a:r>
           </a:p>
         </p:txBody>
@@ -19806,7 +19831,7 @@
               <a:rPr lang="de-DE" dirty="0">
                 <a:latin typeface="+mn-lt"/>
               </a:rPr>
-              <a:t>TriXX überträgt nur Events mit gleichem Key-Wert in geordneter Folge, alle anderen zeitnah aber ohne Garantie der Reihenfolge (Zielkonflikt mit paralleler Verarbeitung</a:t>
+              <a:t>Es werden nur Events mit gleichem Key-Wert in geordneter Folge übertragen, alle anderen zeitnah aber ohne Garantie der Reihenfolge (Zielkonflikt mit paralleler Verarbeitung</a:t>
             </a:r>
           </a:p>
         </p:txBody>
@@ -22596,7 +22621,7 @@
               <a:rPr lang="de-DE" dirty="0">
                 <a:latin typeface="+mn-lt"/>
               </a:rPr>
-              <a:t>Die Synchronisation über DB-Locks per SELECT … FOR UPDATE SKIP LOCKED würde prinzipiell auch erlauben, mehrere TriXX-Instanzen parallel aktiv zu betreiben.</a:t>
+              <a:t>Die Synchronisation über DB-Locks per SELECT … FOR UPDATE SKIP LOCKED würde prinzipiell auch erlauben, mehrere Instanzen von MOVEX CDC parallel aktiv zu betreiben.</a:t>
             </a:r>
           </a:p>
         </p:txBody>
@@ -23066,7 +23091,7 @@
               <a:rPr lang="de-DE" dirty="0">
                 <a:latin typeface="+mn-lt"/>
               </a:rPr>
-              <a:t>Eine heiße Redundanz mit mehreren aktiven TriXX-Instanzen sollte i.d.R. nicht notwendig sein, da:</a:t>
+              <a:t>Eine heiße Redundanz mit mehreren aktiven Instanzen sollte i.d.R. nicht notwendig sein, da:</a:t>
             </a:r>
           </a:p>
           <a:p>
@@ -23084,7 +23109,7 @@
               <a:rPr lang="de-DE" dirty="0">
                 <a:latin typeface="+mn-lt"/>
               </a:rPr>
-              <a:t>Ein lückenloser Betrieb der TriXX-Applikation nicht zwingend notwendig ist:</a:t>
+              <a:t>Ein lückenloser Betrieb der Applikation nicht zwingend notwendig ist:</a:t>
             </a:r>
           </a:p>
           <a:p>
@@ -23093,7 +23118,7 @@
               <a:rPr lang="de-DE" dirty="0">
                 <a:latin typeface="+mn-lt"/>
               </a:rPr>
-              <a:t>Für das Fangen der Events per DB-Trigger ist keine laufende TriXX-Instanz notwendig</a:t>
+              <a:t>Für das Fangen der Events per DB-Trigger ist keine laufende Instanz notwendig</a:t>
             </a:r>
           </a:p>
           <a:p>
@@ -23102,7 +23127,7 @@
               <a:rPr lang="de-DE" dirty="0">
                 <a:latin typeface="+mn-lt"/>
               </a:rPr>
-              <a:t>Suspendierung der TriXX-Ausführung führt nicht zu Datenverlusten, sondern nur zu Verzögerung der Übertragung an Kafka</a:t>
+              <a:t>Suspendierung der Ausführung der Applikation führt nicht zu Datenverlusten, sondern nur zu Verzögerung der Übertragung an Kafka</a:t>
             </a:r>
           </a:p>
           <a:p>
@@ -24811,7 +24836,7 @@
               <a:rPr lang="de-DE" dirty="0">
                 <a:latin typeface="+mn-lt"/>
               </a:rPr>
-              <a:t>Das Partitionierungsintervall als auch die maximale Anzahl simultaner Transaktionen (INI_TRANS) sind über die Konfiguration von TriXX steuerbar</a:t>
+              <a:t>Das Partitionierungsintervall als auch die maximale Anzahl simultaner Transaktionen (INI_TRANS) sind über die Konfiguration steuerbar</a:t>
             </a:r>
           </a:p>
           <a:p>
@@ -25350,7 +25375,7 @@
               <a:rPr lang="de-DE" dirty="0">
                 <a:latin typeface="+mn-lt"/>
               </a:rPr>
-              <a:t>Netzwerk-Latenz und Durchsatz / Distanz zwischen DB, TriXX-Instanz und Kafka-Cluster</a:t>
+              <a:t>Netzwerk-Latenz und Durchsatz / Distanz zwischen DB, MOVEX CDC-Instanz und Kafka-Cluster</a:t>
             </a:r>
           </a:p>
           <a:p>
@@ -26111,7 +26136,7 @@
               <a:rPr lang="de-DE" dirty="0">
                 <a:latin typeface="+mn-lt"/>
               </a:rPr>
-              <a:t>Lieferartefakt von TriXX ist genau ein konsistentes Docker-Image</a:t>
+              <a:t>Lieferartefakt von MOVEX Change Data Capture ist genau ein konsistentes Docker-Image</a:t>
             </a:r>
           </a:p>
           <a:p>
@@ -26222,7 +26247,7 @@
               <a:rPr lang="de-DE" dirty="0">
                 <a:latin typeface="+mn-lt"/>
               </a:rPr>
-              <a:t>Temporäre Ausfälle  bzw. Nichterreichbarkeit von DB oder Kafka werden durch TriXX toleriert.</a:t>
+              <a:t>Temporäre Ausfälle  bzw. Nichterreichbarkeit von DB oder Kafka werden toleriert.</a:t>
             </a:r>
             <a:br>
               <a:rPr lang="de-DE" dirty="0">
@@ -26233,7 +26258,7 @@
               <a:rPr lang="de-DE" dirty="0">
                 <a:latin typeface="+mn-lt"/>
               </a:rPr>
-              <a:t>Nach Wiederverfügbarkeit der Ressourcen wird Betrieb ohne weitere externe Aktivität wieder aufgenommen.</a:t>
+              <a:t>Nach Wiederverfügbarkeit der Ressourcen wird der Betrieb innerhalb der laufenden Container-Instanz ohne weitere externe Aktivität wieder aufgenommen.</a:t>
             </a:r>
           </a:p>
           <a:p>
@@ -27958,40 +27983,25 @@
           <a:p>
             <a:r>
               <a:rPr lang="de-DE" dirty="0"/>
-              <a:t>Die Bereitstellung von TriXX durch OSP als </a:t>
-            </a:r>
-            <a:r>
-              <a:rPr lang="de-DE" dirty="0" err="1"/>
-              <a:t>OpenSource</a:t>
-            </a:r>
+              <a:t>Innerhalb der Otto Group firmierte das Tool unter dem Namen „TriXX“</a:t>
+            </a:r>
+          </a:p>
+          <a:p>
             <a:r>
               <a:rPr lang="de-DE" dirty="0"/>
-              <a:t> ist beabsichtigt, aber noch nicht vollzogen.</a:t>
+              <a:t>Da dieser Name anderweitig markenrechtlich geschützt ist, wurde der Name für das externe Angebot als Open Source geändert in „MOVEX Change Data Capture“</a:t>
             </a:r>
           </a:p>
           <a:p>
             <a:r>
               <a:rPr lang="de-DE" dirty="0"/>
-              <a:t>Die Entscheidung ist getroffen, es müssen aktuell aber noch einige Details geklärt werden. </a:t>
-            </a:r>
-            <a:br>
+              <a:t>Die Bereitstellung als Open Source erfolgt zeitnah</a:t>
+            </a:r>
+          </a:p>
+          <a:p>
+            <a:r>
               <a:rPr lang="de-DE" dirty="0"/>
-            </a:br>
-            <a:r>
-              <a:rPr lang="de-DE" dirty="0"/>
-              <a:t>Wir erwarten dass dies zum Januar 2022 geklärt ist.</a:t>
-            </a:r>
-          </a:p>
-          <a:p>
-            <a:r>
-              <a:rPr lang="de-DE" dirty="0"/>
-              <a:t>Eventuell muss dabei der Name des Tools noch geändert werden.</a:t>
-            </a:r>
-          </a:p>
-          <a:p>
-            <a:r>
-              <a:rPr lang="de-DE" dirty="0"/>
-              <a:t>Wenn Sie nach der Veröffentlichung von TriXX informiert werden möchten, </a:t>
+              <a:t>Wenn Sie nach der Veröffentlichung von MOVEX Change Data Capture informiert werden möchten, </a:t>
             </a:r>
             <a:br>
               <a:rPr lang="de-DE" dirty="0"/>
@@ -28014,7 +28024,7 @@
           <a:p>
             <a:r>
               <a:rPr lang="de-DE" dirty="0"/>
-              <a:t>Detaillierte Informationen zu TriXX finden Sie bereits jetzt hier:</a:t>
+              <a:t>Detaillierte Informationen zu MOVEX Change Data Capture finden Sie bereits jetzt hier:</a:t>
             </a:r>
             <a:br>
               <a:rPr lang="de-DE" dirty="0"/>
@@ -28272,7 +28282,7 @@
             </a:br>
             <a:r>
               <a:rPr lang="de-DE" sz="2000" dirty="0"/>
-              <a:t>TriXX-Dokumentation: 	 </a:t>
+              <a:t>URLs zur Dokumentation des Produkts: 	 </a:t>
             </a:r>
             <a:br>
               <a:rPr lang="de-DE" sz="2000" dirty="0"/>
@@ -30125,7 +30135,7 @@
                 <a:ea typeface="Calibri" charset="0"/>
                 <a:cs typeface="Calibri" charset="0"/>
               </a:rPr>
-              <a:t>Ziel-Szenario mit TriXX</a:t>
+              <a:t>Ziel-Szenario mit MOVEX Change Data Capture</a:t>
             </a:r>
           </a:p>
           <a:p>
@@ -31496,8 +31506,8 @@
         </p:nvSpPr>
         <p:spPr>
           <a:xfrm>
-            <a:off x="6917390" y="3417022"/>
-            <a:ext cx="641300" cy="234892"/>
+            <a:off x="6915060" y="3363791"/>
+            <a:ext cx="734528" cy="341355"/>
           </a:xfrm>
           <a:prstGeom prst="rect">
             <a:avLst/>
@@ -31535,7 +31545,14 @@
             <a:pPr algn="ctr"/>
             <a:r>
               <a:rPr lang="de-DE" sz="1200" dirty="0"/>
-              <a:t>TriXX</a:t>
+              <a:t>MOVEX</a:t>
+            </a:r>
+          </a:p>
+          <a:p>
+            <a:pPr algn="ctr"/>
+            <a:r>
+              <a:rPr lang="de-DE" sz="1200" dirty="0"/>
+              <a:t>CDC</a:t>
             </a:r>
           </a:p>
         </p:txBody>
@@ -31557,8 +31574,8 @@
         </p:nvCxnSpPr>
         <p:spPr>
           <a:xfrm flipV="1">
-            <a:off x="6784579" y="3534468"/>
-            <a:ext cx="132811" cy="9561"/>
+            <a:off x="6783414" y="3534469"/>
+            <a:ext cx="131646" cy="13436"/>
           </a:xfrm>
           <a:prstGeom prst="straightConnector1">
             <a:avLst/>
@@ -31653,14 +31670,15 @@
           </p:cNvPr>
           <p:cNvCxnSpPr>
             <a:cxnSpLocks/>
+            <a:stCxn id="83" idx="3"/>
             <a:endCxn id="87" idx="2"/>
           </p:cNvCxnSpPr>
           <p:nvPr/>
         </p:nvCxnSpPr>
         <p:spPr>
-          <a:xfrm>
-            <a:off x="7558689" y="3527087"/>
-            <a:ext cx="258500" cy="0"/>
+          <a:xfrm flipV="1">
+            <a:off x="7649588" y="3527087"/>
+            <a:ext cx="167601" cy="7382"/>
           </a:xfrm>
           <a:prstGeom prst="straightConnector1">
             <a:avLst/>
@@ -35200,7 +35218,7 @@
         </p:nvSpPr>
         <p:spPr>
           <a:xfrm>
-            <a:off x="222767" y="928513"/>
+            <a:off x="222761" y="921110"/>
             <a:ext cx="8623725" cy="405338"/>
           </a:xfrm>
           <a:prstGeom prst="rect">
@@ -35437,7 +35455,7 @@
         </p:nvSpPr>
         <p:spPr>
           <a:xfrm>
-            <a:off x="222767" y="1402338"/>
+            <a:off x="222765" y="1435925"/>
             <a:ext cx="8623725" cy="602632"/>
           </a:xfrm>
           <a:prstGeom prst="rect">
@@ -35653,7 +35671,22 @@
                 <a:ea typeface="Calibri" charset="0"/>
                 <a:cs typeface="Calibri" charset="0"/>
               </a:rPr>
-              <a:t>Eigenes Schema für TriXX in Quell-DB, keine Objekte oder Operationen außerhalb dieses Schemas, =&gt; damit kein Struktur-Impact auf die ‚abzuschöpfende‘ Applikation</a:t>
+              <a:t>Eigenes Schema für in Quell-DB, keine Objekte oder Operationen außerhalb dieses Schemas, </a:t>
+            </a:r>
+            <a:br>
+              <a:rPr lang="de-DE" dirty="0">
+                <a:latin typeface="+mn-lt"/>
+                <a:ea typeface="Calibri" charset="0"/>
+                <a:cs typeface="Calibri" charset="0"/>
+              </a:rPr>
+            </a:br>
+            <a:r>
+              <a:rPr lang="de-DE" dirty="0">
+                <a:latin typeface="+mn-lt"/>
+                <a:ea typeface="Calibri" charset="0"/>
+                <a:cs typeface="Calibri" charset="0"/>
+              </a:rPr>
+              <a:t>=&gt; damit kein Struktur-Impact auf die ‚abzuschöpfende‘ Applikation</a:t>
             </a:r>
           </a:p>
         </p:txBody>
@@ -35674,8 +35707,8 @@
         </p:nvSpPr>
         <p:spPr>
           <a:xfrm>
-            <a:off x="222767" y="2075990"/>
-            <a:ext cx="8623725" cy="1062541"/>
+            <a:off x="222764" y="2144977"/>
+            <a:ext cx="8623725" cy="885419"/>
           </a:xfrm>
           <a:prstGeom prst="rect">
             <a:avLst/>
@@ -35888,7 +35921,7 @@
               <a:rPr lang="de-DE" dirty="0">
                 <a:latin typeface="+mn-lt"/>
               </a:rPr>
-              <a:t>Puffern der zu übertragenden Change Events durch Trigger in lokaler Tabelle der DB im TriXX-Schema</a:t>
+              <a:t>Puffern der Change Events  aus den Trigger in lokaler Tabelle der DB in separatem Schema</a:t>
             </a:r>
             <a:br>
               <a:rPr lang="de-DE" dirty="0">
@@ -35899,7 +35932,7 @@
               <a:rPr lang="de-DE" dirty="0">
                 <a:latin typeface="+mn-lt"/>
               </a:rPr>
-              <a:t>=&gt; damit keine Abhängigkeit der Event-auslösenden Transaktionen von externen Ressourcen wie TriXX-Applikation oder Kafka</a:t>
+              <a:t>=&gt; damit keine Abhängigkeit der Event-auslösenden Transaktionen von externen Ressourcen wie MOVEX CDC-Applikation oder Kafka</a:t>
             </a:r>
           </a:p>
         </p:txBody>
@@ -35920,7 +35953,7 @@
         </p:nvSpPr>
         <p:spPr>
           <a:xfrm>
-            <a:off x="222766" y="3209551"/>
+            <a:off x="222763" y="3136816"/>
             <a:ext cx="8623725" cy="741664"/>
           </a:xfrm>
           <a:prstGeom prst="rect">
@@ -36164,7 +36197,7 @@
         </p:nvSpPr>
         <p:spPr>
           <a:xfrm>
-            <a:off x="222765" y="4022236"/>
+            <a:off x="222763" y="3989589"/>
             <a:ext cx="8623725" cy="450796"/>
           </a:xfrm>
           <a:prstGeom prst="rect">
@@ -36378,7 +36411,7 @@
               <a:rPr lang="de-DE" dirty="0">
                 <a:latin typeface="+mn-lt"/>
               </a:rPr>
-              <a:t>Generierung der Trigger auf Basis der per GUI erfassten Konfiguration im TriXX-Schema</a:t>
+              <a:t>Generierung der Trigger auf Basis der per GUI erfassten Konfiguration im eigenen Schema</a:t>
             </a:r>
           </a:p>
         </p:txBody>
@@ -36399,7 +36432,7 @@
         </p:nvSpPr>
         <p:spPr>
           <a:xfrm>
-            <a:off x="222765" y="4547898"/>
+            <a:off x="222762" y="4551494"/>
             <a:ext cx="8623725" cy="450797"/>
           </a:xfrm>
           <a:prstGeom prst="rect">

</xml_diff>